<commit_message>
Add protype of project-presentation
</commit_message>
<xml_diff>
--- a/concept/project-presentation.pptx
+++ b/concept/project-presentation.pptx
@@ -6,6 +6,13 @@
   </p:sldMasterIdLst>
   <p:sldIdLst>
     <p:sldId id="256" r:id="rId2"/>
+    <p:sldId id="257" r:id="rId3"/>
+    <p:sldId id="261" r:id="rId4"/>
+    <p:sldId id="262" r:id="rId5"/>
+    <p:sldId id="259" r:id="rId6"/>
+    <p:sldId id="260" r:id="rId7"/>
+    <p:sldId id="263" r:id="rId8"/>
+    <p:sldId id="258" r:id="rId9"/>
   </p:sldIdLst>
   <p:sldSz cx="12192000" cy="6858000"/>
   <p:notesSz cx="6858000" cy="9144000"/>
@@ -104,6 +111,11 @@
       </a:defRPr>
     </a:lvl9pPr>
   </p:defaultTextStyle>
+  <p:extLst>
+    <p:ext uri="{EFAFB233-063F-42B5-8137-9DF3F51BA10A}">
+      <p15:sldGuideLst xmlns:p15="http://schemas.microsoft.com/office/powerpoint/2012/main"/>
+    </p:ext>
+  </p:extLst>
 </p:presentation>
 </file>
 
@@ -238,7 +250,7 @@
           <a:p>
             <a:fld id="{F2DD08D9-7444-4DFB-8F1F-9B0CBC03251A}" type="datetimeFigureOut">
               <a:rPr lang="de-AT" smtClean="0"/>
-              <a:t>23.09.2016</a:t>
+              <a:t>25.09.2016</a:t>
             </a:fld>
             <a:endParaRPr lang="de-AT"/>
           </a:p>
@@ -408,7 +420,7 @@
           <a:p>
             <a:fld id="{F2DD08D9-7444-4DFB-8F1F-9B0CBC03251A}" type="datetimeFigureOut">
               <a:rPr lang="de-AT" smtClean="0"/>
-              <a:t>23.09.2016</a:t>
+              <a:t>25.09.2016</a:t>
             </a:fld>
             <a:endParaRPr lang="de-AT"/>
           </a:p>
@@ -588,7 +600,7 @@
           <a:p>
             <a:fld id="{F2DD08D9-7444-4DFB-8F1F-9B0CBC03251A}" type="datetimeFigureOut">
               <a:rPr lang="de-AT" smtClean="0"/>
-              <a:t>23.09.2016</a:t>
+              <a:t>25.09.2016</a:t>
             </a:fld>
             <a:endParaRPr lang="de-AT"/>
           </a:p>
@@ -758,7 +770,7 @@
           <a:p>
             <a:fld id="{F2DD08D9-7444-4DFB-8F1F-9B0CBC03251A}" type="datetimeFigureOut">
               <a:rPr lang="de-AT" smtClean="0"/>
-              <a:t>23.09.2016</a:t>
+              <a:t>25.09.2016</a:t>
             </a:fld>
             <a:endParaRPr lang="de-AT"/>
           </a:p>
@@ -1004,7 +1016,7 @@
           <a:p>
             <a:fld id="{F2DD08D9-7444-4DFB-8F1F-9B0CBC03251A}" type="datetimeFigureOut">
               <a:rPr lang="de-AT" smtClean="0"/>
-              <a:t>23.09.2016</a:t>
+              <a:t>25.09.2016</a:t>
             </a:fld>
             <a:endParaRPr lang="de-AT"/>
           </a:p>
@@ -1236,7 +1248,7 @@
           <a:p>
             <a:fld id="{F2DD08D9-7444-4DFB-8F1F-9B0CBC03251A}" type="datetimeFigureOut">
               <a:rPr lang="de-AT" smtClean="0"/>
-              <a:t>23.09.2016</a:t>
+              <a:t>25.09.2016</a:t>
             </a:fld>
             <a:endParaRPr lang="de-AT"/>
           </a:p>
@@ -1603,7 +1615,7 @@
           <a:p>
             <a:fld id="{F2DD08D9-7444-4DFB-8F1F-9B0CBC03251A}" type="datetimeFigureOut">
               <a:rPr lang="de-AT" smtClean="0"/>
-              <a:t>23.09.2016</a:t>
+              <a:t>25.09.2016</a:t>
             </a:fld>
             <a:endParaRPr lang="de-AT"/>
           </a:p>
@@ -1721,7 +1733,7 @@
           <a:p>
             <a:fld id="{F2DD08D9-7444-4DFB-8F1F-9B0CBC03251A}" type="datetimeFigureOut">
               <a:rPr lang="de-AT" smtClean="0"/>
-              <a:t>23.09.2016</a:t>
+              <a:t>25.09.2016</a:t>
             </a:fld>
             <a:endParaRPr lang="de-AT"/>
           </a:p>
@@ -1816,7 +1828,7 @@
           <a:p>
             <a:fld id="{F2DD08D9-7444-4DFB-8F1F-9B0CBC03251A}" type="datetimeFigureOut">
               <a:rPr lang="de-AT" smtClean="0"/>
-              <a:t>23.09.2016</a:t>
+              <a:t>25.09.2016</a:t>
             </a:fld>
             <a:endParaRPr lang="de-AT"/>
           </a:p>
@@ -2093,7 +2105,7 @@
           <a:p>
             <a:fld id="{F2DD08D9-7444-4DFB-8F1F-9B0CBC03251A}" type="datetimeFigureOut">
               <a:rPr lang="de-AT" smtClean="0"/>
-              <a:t>23.09.2016</a:t>
+              <a:t>25.09.2016</a:t>
             </a:fld>
             <a:endParaRPr lang="de-AT"/>
           </a:p>
@@ -2346,7 +2358,7 @@
           <a:p>
             <a:fld id="{F2DD08D9-7444-4DFB-8F1F-9B0CBC03251A}" type="datetimeFigureOut">
               <a:rPr lang="de-AT" smtClean="0"/>
-              <a:t>23.09.2016</a:t>
+              <a:t>25.09.2016</a:t>
             </a:fld>
             <a:endParaRPr lang="de-AT"/>
           </a:p>
@@ -2559,7 +2571,7 @@
           <a:p>
             <a:fld id="{F2DD08D9-7444-4DFB-8F1F-9B0CBC03251A}" type="datetimeFigureOut">
               <a:rPr lang="de-AT" smtClean="0"/>
-              <a:t>23.09.2016</a:t>
+              <a:t>25.09.2016</a:t>
             </a:fld>
             <a:endParaRPr lang="de-AT"/>
           </a:p>
@@ -3006,8 +3018,12 @@
           <a:lstStyle/>
           <a:p>
             <a:r>
-              <a:rPr lang="de-AT" dirty="0"/>
-              <a:t>A Fantasy Bullethell Roguelike RPG</a:t>
+              <a:rPr lang="de-AT" dirty="0">
+                <a:latin typeface="Open Sans" panose="020B0606030504020204" pitchFamily="34" charset="0"/>
+                <a:ea typeface="Open Sans" panose="020B0606030504020204" pitchFamily="34" charset="0"/>
+                <a:cs typeface="Open Sans" panose="020B0606030504020204" pitchFamily="34" charset="0"/>
+              </a:rPr>
+              <a:t>A STORY BASED BULLETHELL ROGUELIKE RPG</a:t>
             </a:r>
           </a:p>
         </p:txBody>
@@ -3016,6 +3032,1060 @@
     <p:extLst>
       <p:ext uri="{BB962C8B-B14F-4D97-AF65-F5344CB8AC3E}">
         <p14:creationId xmlns:p14="http://schemas.microsoft.com/office/powerpoint/2010/main" val="709922704"/>
+      </p:ext>
+    </p:extLst>
+  </p:cSld>
+  <p:clrMapOvr>
+    <a:masterClrMapping/>
+  </p:clrMapOvr>
+</p:sld>
+</file>
+
+<file path=ppt/slides/slide2.xml><?xml version="1.0" encoding="utf-8"?>
+<p:sld xmlns:a="http://schemas.openxmlformats.org/drawingml/2006/main" xmlns:r="http://schemas.openxmlformats.org/officeDocument/2006/relationships" xmlns:p="http://schemas.openxmlformats.org/presentationml/2006/main">
+  <p:cSld>
+    <p:spTree>
+      <p:nvGrpSpPr>
+        <p:cNvPr id="1" name=""/>
+        <p:cNvGrpSpPr/>
+        <p:nvPr/>
+      </p:nvGrpSpPr>
+      <p:grpSpPr>
+        <a:xfrm>
+          <a:off x="0" y="0"/>
+          <a:ext cx="0" cy="0"/>
+          <a:chOff x="0" y="0"/>
+          <a:chExt cx="0" cy="0"/>
+        </a:xfrm>
+      </p:grpSpPr>
+      <p:sp>
+        <p:nvSpPr>
+          <p:cNvPr id="2" name="Titel 1"/>
+          <p:cNvSpPr>
+            <a:spLocks noGrp="1"/>
+          </p:cNvSpPr>
+          <p:nvPr>
+            <p:ph type="title"/>
+          </p:nvPr>
+        </p:nvSpPr>
+        <p:spPr/>
+        <p:txBody>
+          <a:bodyPr/>
+          <a:lstStyle/>
+          <a:p>
+            <a:r>
+              <a:rPr lang="de-AT" dirty="0">
+                <a:latin typeface="DejaVu Serif" panose="02060603050605020204" pitchFamily="18" charset="0"/>
+                <a:ea typeface="DejaVu Serif" panose="02060603050605020204" pitchFamily="18" charset="0"/>
+                <a:cs typeface="DejaVu Serif" panose="02060603050605020204" pitchFamily="18" charset="0"/>
+              </a:rPr>
+              <a:t>Index</a:t>
+            </a:r>
+          </a:p>
+        </p:txBody>
+      </p:sp>
+      <p:sp>
+        <p:nvSpPr>
+          <p:cNvPr id="3" name="Inhaltsplatzhalter 2"/>
+          <p:cNvSpPr>
+            <a:spLocks noGrp="1"/>
+          </p:cNvSpPr>
+          <p:nvPr>
+            <p:ph idx="1"/>
+          </p:nvPr>
+        </p:nvSpPr>
+        <p:spPr/>
+        <p:txBody>
+          <a:bodyPr>
+            <a:normAutofit/>
+          </a:bodyPr>
+          <a:lstStyle/>
+          <a:p>
+            <a:r>
+              <a:rPr lang="de-AT" dirty="0">
+                <a:latin typeface="Open Sans" panose="020B0606030504020204" pitchFamily="34" charset="0"/>
+                <a:ea typeface="Open Sans" panose="020B0606030504020204" pitchFamily="34" charset="0"/>
+                <a:cs typeface="Open Sans" panose="020B0606030504020204" pitchFamily="34" charset="0"/>
+              </a:rPr>
+              <a:t>Kurzbeschreibung</a:t>
+            </a:r>
+          </a:p>
+          <a:p>
+            <a:r>
+              <a:rPr lang="de-AT" dirty="0">
+                <a:latin typeface="Open Sans" panose="020B0606030504020204" pitchFamily="34" charset="0"/>
+                <a:ea typeface="Open Sans" panose="020B0606030504020204" pitchFamily="34" charset="0"/>
+                <a:cs typeface="Open Sans" panose="020B0606030504020204" pitchFamily="34" charset="0"/>
+              </a:rPr>
+              <a:t>Handlung?</a:t>
+            </a:r>
+          </a:p>
+          <a:p>
+            <a:r>
+              <a:rPr lang="de-AT" dirty="0">
+                <a:latin typeface="Open Sans" panose="020B0606030504020204" pitchFamily="34" charset="0"/>
+                <a:ea typeface="Open Sans" panose="020B0606030504020204" pitchFamily="34" charset="0"/>
+                <a:cs typeface="Open Sans" panose="020B0606030504020204" pitchFamily="34" charset="0"/>
+              </a:rPr>
+              <a:t>Gameplay</a:t>
+            </a:r>
+          </a:p>
+          <a:p>
+            <a:r>
+              <a:rPr lang="de-AT" dirty="0">
+                <a:latin typeface="Open Sans" panose="020B0606030504020204" pitchFamily="34" charset="0"/>
+                <a:ea typeface="Open Sans" panose="020B0606030504020204" pitchFamily="34" charset="0"/>
+                <a:cs typeface="Open Sans" panose="020B0606030504020204" pitchFamily="34" charset="0"/>
+              </a:rPr>
+              <a:t>Grafik</a:t>
+            </a:r>
+          </a:p>
+          <a:p>
+            <a:r>
+              <a:rPr lang="de-AT" dirty="0">
+                <a:latin typeface="Open Sans" panose="020B0606030504020204" pitchFamily="34" charset="0"/>
+                <a:ea typeface="Open Sans" panose="020B0606030504020204" pitchFamily="34" charset="0"/>
+                <a:cs typeface="Open Sans" panose="020B0606030504020204" pitchFamily="34" charset="0"/>
+              </a:rPr>
+              <a:t>Zieldefinition</a:t>
+            </a:r>
+          </a:p>
+          <a:p>
+            <a:r>
+              <a:rPr lang="de-AT" dirty="0">
+                <a:latin typeface="Open Sans" panose="020B0606030504020204" pitchFamily="34" charset="0"/>
+                <a:ea typeface="Open Sans" panose="020B0606030504020204" pitchFamily="34" charset="0"/>
+                <a:cs typeface="Open Sans" panose="020B0606030504020204" pitchFamily="34" charset="0"/>
+              </a:rPr>
+              <a:t>Deadlines?</a:t>
+            </a:r>
+          </a:p>
+          <a:p>
+            <a:r>
+              <a:rPr lang="de-AT" dirty="0">
+                <a:latin typeface="Open Sans" panose="020B0606030504020204" pitchFamily="34" charset="0"/>
+                <a:ea typeface="Open Sans" panose="020B0606030504020204" pitchFamily="34" charset="0"/>
+                <a:cs typeface="Open Sans" panose="020B0606030504020204" pitchFamily="34" charset="0"/>
+              </a:rPr>
+              <a:t>Kosten / Gewinn</a:t>
+            </a:r>
+          </a:p>
+        </p:txBody>
+      </p:sp>
+    </p:spTree>
+    <p:extLst>
+      <p:ext uri="{BB962C8B-B14F-4D97-AF65-F5344CB8AC3E}">
+        <p14:creationId xmlns:p14="http://schemas.microsoft.com/office/powerpoint/2010/main" val="4207793744"/>
+      </p:ext>
+    </p:extLst>
+  </p:cSld>
+  <p:clrMapOvr>
+    <a:masterClrMapping/>
+  </p:clrMapOvr>
+</p:sld>
+</file>
+
+<file path=ppt/slides/slide3.xml><?xml version="1.0" encoding="utf-8"?>
+<p:sld xmlns:a="http://schemas.openxmlformats.org/drawingml/2006/main" xmlns:r="http://schemas.openxmlformats.org/officeDocument/2006/relationships" xmlns:p="http://schemas.openxmlformats.org/presentationml/2006/main">
+  <p:cSld>
+    <p:spTree>
+      <p:nvGrpSpPr>
+        <p:cNvPr id="1" name=""/>
+        <p:cNvGrpSpPr/>
+        <p:nvPr/>
+      </p:nvGrpSpPr>
+      <p:grpSpPr>
+        <a:xfrm>
+          <a:off x="0" y="0"/>
+          <a:ext cx="0" cy="0"/>
+          <a:chOff x="0" y="0"/>
+          <a:chExt cx="0" cy="0"/>
+        </a:xfrm>
+      </p:grpSpPr>
+      <p:sp>
+        <p:nvSpPr>
+          <p:cNvPr id="2" name="Titel 1"/>
+          <p:cNvSpPr>
+            <a:spLocks noGrp="1"/>
+          </p:cNvSpPr>
+          <p:nvPr>
+            <p:ph type="title"/>
+          </p:nvPr>
+        </p:nvSpPr>
+        <p:spPr/>
+        <p:txBody>
+          <a:bodyPr>
+            <a:normAutofit/>
+          </a:bodyPr>
+          <a:lstStyle/>
+          <a:p>
+            <a:r>
+              <a:rPr lang="de-AT" dirty="0">
+                <a:latin typeface="DejaVu Serif" panose="02060603050605020204" pitchFamily="18" charset="0"/>
+                <a:ea typeface="DejaVu Serif" panose="02060603050605020204" pitchFamily="18" charset="0"/>
+                <a:cs typeface="DejaVu Serif" panose="02060603050605020204" pitchFamily="18" charset="0"/>
+              </a:rPr>
+              <a:t>Kurzbeschreibung</a:t>
+            </a:r>
+          </a:p>
+        </p:txBody>
+      </p:sp>
+      <p:sp>
+        <p:nvSpPr>
+          <p:cNvPr id="3" name="Inhaltsplatzhalter 2"/>
+          <p:cNvSpPr>
+            <a:spLocks noGrp="1"/>
+          </p:cNvSpPr>
+          <p:nvPr>
+            <p:ph idx="1"/>
+          </p:nvPr>
+        </p:nvSpPr>
+        <p:spPr/>
+        <p:txBody>
+          <a:bodyPr>
+            <a:normAutofit fontScale="92500"/>
+          </a:bodyPr>
+          <a:lstStyle/>
+          <a:p>
+            <a:r>
+              <a:rPr lang="de-AT" b="1" dirty="0"/>
+              <a:t>CODENAME: HERO</a:t>
+            </a:r>
+            <a:r>
+              <a:rPr lang="de-AT" dirty="0"/>
+              <a:t> beschreibt ein </a:t>
+            </a:r>
+            <a:r>
+              <a:rPr lang="de-AT" b="1" dirty="0"/>
+              <a:t>Fantasy</a:t>
+            </a:r>
+            <a:r>
+              <a:rPr lang="de-AT" dirty="0"/>
+              <a:t> </a:t>
+            </a:r>
+            <a:r>
+              <a:rPr lang="de-AT" b="1" dirty="0"/>
+              <a:t>Rollenspiel</a:t>
+            </a:r>
+            <a:r>
+              <a:rPr lang="de-AT" dirty="0"/>
+              <a:t> mit </a:t>
+            </a:r>
+            <a:r>
+              <a:rPr lang="de-AT" b="1" dirty="0"/>
+              <a:t>Rougelike</a:t>
+            </a:r>
+            <a:r>
+              <a:rPr lang="de-AT" dirty="0"/>
+              <a:t>, </a:t>
+            </a:r>
+            <a:r>
+              <a:rPr lang="de-AT" b="1" dirty="0"/>
+              <a:t>Bullethell</a:t>
+            </a:r>
+            <a:r>
+              <a:rPr lang="de-AT" dirty="0"/>
+              <a:t> und </a:t>
+            </a:r>
+            <a:r>
+              <a:rPr lang="de-AT" b="1" dirty="0"/>
+              <a:t>Story</a:t>
+            </a:r>
+            <a:r>
+              <a:rPr lang="de-AT" dirty="0"/>
+              <a:t> Elementen. </a:t>
+            </a:r>
+          </a:p>
+          <a:p>
+            <a:r>
+              <a:rPr lang="de-AT" dirty="0"/>
+              <a:t>Der Spieler wählt zwischen mehreren Charakteren mit unterschiedlichen Fähigkeiten. </a:t>
+            </a:r>
+          </a:p>
+          <a:p>
+            <a:r>
+              <a:rPr lang="de-AT" dirty="0"/>
+              <a:t>Er bewegt sich durch eine offene Spielwelt und kämpft gegen die dort angesiedelten Gegner. </a:t>
+            </a:r>
+          </a:p>
+          <a:p>
+            <a:r>
+              <a:rPr lang="de-AT" dirty="0"/>
+              <a:t>Während des Spiels wird der Charakter laufend stärker, man erhält besseres Equipment und schaltet weitere Inhalte frei. </a:t>
+            </a:r>
+          </a:p>
+          <a:p>
+            <a:r>
+              <a:rPr lang="de-AT" dirty="0"/>
+              <a:t>Wird der Spieler besiegt, verliert er den aktuellen Charakter und bekommt Punkte welche zum Beispiel für neue Items eingelöst werden können.</a:t>
+            </a:r>
+          </a:p>
+          <a:p>
+            <a:endParaRPr lang="de-AT" dirty="0"/>
+          </a:p>
+        </p:txBody>
+      </p:sp>
+    </p:spTree>
+    <p:extLst>
+      <p:ext uri="{BB962C8B-B14F-4D97-AF65-F5344CB8AC3E}">
+        <p14:creationId xmlns:p14="http://schemas.microsoft.com/office/powerpoint/2010/main" val="1294340396"/>
+      </p:ext>
+    </p:extLst>
+  </p:cSld>
+  <p:clrMapOvr>
+    <a:masterClrMapping/>
+  </p:clrMapOvr>
+</p:sld>
+</file>
+
+<file path=ppt/slides/slide4.xml><?xml version="1.0" encoding="utf-8"?>
+<p:sld xmlns:a="http://schemas.openxmlformats.org/drawingml/2006/main" xmlns:r="http://schemas.openxmlformats.org/officeDocument/2006/relationships" xmlns:p="http://schemas.openxmlformats.org/presentationml/2006/main">
+  <p:cSld>
+    <p:spTree>
+      <p:nvGrpSpPr>
+        <p:cNvPr id="1" name=""/>
+        <p:cNvGrpSpPr/>
+        <p:nvPr/>
+      </p:nvGrpSpPr>
+      <p:grpSpPr>
+        <a:xfrm>
+          <a:off x="0" y="0"/>
+          <a:ext cx="0" cy="0"/>
+          <a:chOff x="0" y="0"/>
+          <a:chExt cx="0" cy="0"/>
+        </a:xfrm>
+      </p:grpSpPr>
+      <p:sp>
+        <p:nvSpPr>
+          <p:cNvPr id="2" name="Titel 1"/>
+          <p:cNvSpPr>
+            <a:spLocks noGrp="1"/>
+          </p:cNvSpPr>
+          <p:nvPr>
+            <p:ph type="title"/>
+          </p:nvPr>
+        </p:nvSpPr>
+        <p:spPr/>
+        <p:txBody>
+          <a:bodyPr/>
+          <a:lstStyle/>
+          <a:p>
+            <a:r>
+              <a:rPr lang="de-AT" dirty="0">
+                <a:latin typeface="DejaVu Serif" panose="02060603050605020204" pitchFamily="18" charset="0"/>
+                <a:ea typeface="DejaVu Serif" panose="02060603050605020204" pitchFamily="18" charset="0"/>
+                <a:cs typeface="DejaVu Serif" panose="02060603050605020204" pitchFamily="18" charset="0"/>
+              </a:rPr>
+              <a:t>Handlung</a:t>
+            </a:r>
+          </a:p>
+        </p:txBody>
+      </p:sp>
+      <p:sp>
+        <p:nvSpPr>
+          <p:cNvPr id="3" name="Inhaltsplatzhalter 2"/>
+          <p:cNvSpPr>
+            <a:spLocks noGrp="1"/>
+          </p:cNvSpPr>
+          <p:nvPr>
+            <p:ph idx="1"/>
+          </p:nvPr>
+        </p:nvSpPr>
+        <p:spPr/>
+        <p:txBody>
+          <a:bodyPr/>
+          <a:lstStyle/>
+          <a:p>
+            <a:r>
+              <a:rPr lang="de-AT" dirty="0"/>
+              <a:t>Die Menschheit befindet sich im Krieg. Nur wenige sind übrig und die Kämpfer wurden bereits stark dezimiert. Die letzten Überlebenden bleiben versteckt auf ihren </a:t>
+            </a:r>
+            <a:r>
+              <a:rPr lang="de-AT" b="1" dirty="0"/>
+              <a:t>Inseln</a:t>
+            </a:r>
+            <a:r>
+              <a:rPr lang="de-AT" dirty="0"/>
+              <a:t>, welche durch uralte </a:t>
+            </a:r>
+            <a:r>
+              <a:rPr lang="de-AT" b="1" dirty="0"/>
+              <a:t>Zauber</a:t>
+            </a:r>
+            <a:r>
+              <a:rPr lang="de-AT" dirty="0"/>
+              <a:t> geschützt werden.</a:t>
+            </a:r>
+          </a:p>
+          <a:p>
+            <a:r>
+              <a:rPr lang="de-AT" dirty="0"/>
+              <a:t>Um Lebensmittel und Material zu beschaffen machen sich die verbliebenen auf in die gefährliche Außenwelt. </a:t>
+            </a:r>
+          </a:p>
+          <a:p>
+            <a:r>
+              <a:rPr lang="de-AT" dirty="0"/>
+              <a:t>Die stärksten von ihnen werden als Helden gefeiert und zieren die </a:t>
+            </a:r>
+            <a:r>
+              <a:rPr lang="de-AT" b="1" dirty="0"/>
+              <a:t>Tafeln</a:t>
+            </a:r>
+            <a:r>
+              <a:rPr lang="de-AT" dirty="0"/>
+              <a:t> im Zentrum der Inseln. Doch auch die Menschen haben ihre Geheimnisse und nicht alle Kämpfer und Helden sind so edel wie sie scheinen...</a:t>
+            </a:r>
+          </a:p>
+          <a:p>
+            <a:endParaRPr lang="de-AT" dirty="0"/>
+          </a:p>
+        </p:txBody>
+      </p:sp>
+    </p:spTree>
+    <p:extLst>
+      <p:ext uri="{BB962C8B-B14F-4D97-AF65-F5344CB8AC3E}">
+        <p14:creationId xmlns:p14="http://schemas.microsoft.com/office/powerpoint/2010/main" val="663286544"/>
+      </p:ext>
+    </p:extLst>
+  </p:cSld>
+  <p:clrMapOvr>
+    <a:masterClrMapping/>
+  </p:clrMapOvr>
+</p:sld>
+</file>
+
+<file path=ppt/slides/slide5.xml><?xml version="1.0" encoding="utf-8"?>
+<p:sld xmlns:a="http://schemas.openxmlformats.org/drawingml/2006/main" xmlns:r="http://schemas.openxmlformats.org/officeDocument/2006/relationships" xmlns:p="http://schemas.openxmlformats.org/presentationml/2006/main">
+  <p:cSld>
+    <p:spTree>
+      <p:nvGrpSpPr>
+        <p:cNvPr id="1" name=""/>
+        <p:cNvGrpSpPr/>
+        <p:nvPr/>
+      </p:nvGrpSpPr>
+      <p:grpSpPr>
+        <a:xfrm>
+          <a:off x="0" y="0"/>
+          <a:ext cx="0" cy="0"/>
+          <a:chOff x="0" y="0"/>
+          <a:chExt cx="0" cy="0"/>
+        </a:xfrm>
+      </p:grpSpPr>
+      <p:sp>
+        <p:nvSpPr>
+          <p:cNvPr id="2" name="Titel 1"/>
+          <p:cNvSpPr>
+            <a:spLocks noGrp="1"/>
+          </p:cNvSpPr>
+          <p:nvPr>
+            <p:ph type="title"/>
+          </p:nvPr>
+        </p:nvSpPr>
+        <p:spPr/>
+        <p:txBody>
+          <a:bodyPr/>
+          <a:lstStyle/>
+          <a:p>
+            <a:r>
+              <a:rPr lang="de-AT" dirty="0">
+                <a:latin typeface="DejaVu Serif" panose="02060603050605020204" pitchFamily="18" charset="0"/>
+                <a:ea typeface="DejaVu Serif" panose="02060603050605020204" pitchFamily="18" charset="0"/>
+                <a:cs typeface="DejaVu Serif" panose="02060603050605020204" pitchFamily="18" charset="0"/>
+              </a:rPr>
+              <a:t>Grafik / Gameplay</a:t>
+            </a:r>
+          </a:p>
+        </p:txBody>
+      </p:sp>
+      <p:sp>
+        <p:nvSpPr>
+          <p:cNvPr id="3" name="Inhaltsplatzhalter 2"/>
+          <p:cNvSpPr>
+            <a:spLocks noGrp="1"/>
+          </p:cNvSpPr>
+          <p:nvPr>
+            <p:ph idx="1"/>
+          </p:nvPr>
+        </p:nvSpPr>
+        <p:spPr/>
+        <p:txBody>
+          <a:bodyPr/>
+          <a:lstStyle/>
+          <a:p>
+            <a:pPr lvl="0"/>
+            <a:r>
+              <a:rPr lang="de-AT" dirty="0"/>
+              <a:t>Death Trash</a:t>
+            </a:r>
+          </a:p>
+          <a:p>
+            <a:pPr lvl="0"/>
+            <a:r>
+              <a:rPr lang="de-AT" dirty="0" err="1"/>
+              <a:t>Duelyst</a:t>
+            </a:r>
+            <a:endParaRPr lang="de-AT" dirty="0"/>
+          </a:p>
+          <a:p>
+            <a:pPr lvl="0"/>
+            <a:r>
+              <a:rPr lang="de-AT" dirty="0"/>
+              <a:t>Dungeon </a:t>
+            </a:r>
+            <a:r>
+              <a:rPr lang="de-AT" dirty="0" err="1"/>
+              <a:t>Souls</a:t>
+            </a:r>
+            <a:endParaRPr lang="de-AT" dirty="0"/>
+          </a:p>
+          <a:p>
+            <a:pPr lvl="0"/>
+            <a:r>
+              <a:rPr lang="de-AT" dirty="0"/>
+              <a:t>Enter the </a:t>
+            </a:r>
+            <a:r>
+              <a:rPr lang="de-AT" dirty="0" err="1"/>
+              <a:t>Gungeon</a:t>
+            </a:r>
+            <a:endParaRPr lang="de-AT" dirty="0"/>
+          </a:p>
+          <a:p>
+            <a:pPr lvl="0"/>
+            <a:r>
+              <a:rPr lang="de-AT" dirty="0"/>
+              <a:t>Realm of the Mad God</a:t>
+            </a:r>
+          </a:p>
+          <a:p>
+            <a:pPr lvl="0"/>
+            <a:r>
+              <a:rPr lang="de-AT" dirty="0" err="1"/>
+              <a:t>Rivals</a:t>
+            </a:r>
+            <a:r>
+              <a:rPr lang="de-AT" dirty="0"/>
+              <a:t> of </a:t>
+            </a:r>
+            <a:r>
+              <a:rPr lang="de-AT" dirty="0" err="1"/>
+              <a:t>Aether</a:t>
+            </a:r>
+            <a:endParaRPr lang="de-AT" dirty="0"/>
+          </a:p>
+          <a:p>
+            <a:pPr lvl="0"/>
+            <a:r>
+              <a:rPr lang="de-AT" dirty="0" err="1"/>
+              <a:t>Stardew</a:t>
+            </a:r>
+            <a:r>
+              <a:rPr lang="de-AT" dirty="0"/>
+              <a:t> Valley</a:t>
+            </a:r>
+          </a:p>
+          <a:p>
+            <a:pPr lvl="0"/>
+            <a:r>
+              <a:rPr lang="de-AT" dirty="0"/>
+              <a:t>Titan </a:t>
+            </a:r>
+            <a:r>
+              <a:rPr lang="de-AT" dirty="0" err="1"/>
+              <a:t>Souls</a:t>
+            </a:r>
+            <a:endParaRPr lang="de-AT" dirty="0"/>
+          </a:p>
+        </p:txBody>
+      </p:sp>
+    </p:spTree>
+    <p:extLst>
+      <p:ext uri="{BB962C8B-B14F-4D97-AF65-F5344CB8AC3E}">
+        <p14:creationId xmlns:p14="http://schemas.microsoft.com/office/powerpoint/2010/main" val="3136522197"/>
+      </p:ext>
+    </p:extLst>
+  </p:cSld>
+  <p:clrMapOvr>
+    <a:masterClrMapping/>
+  </p:clrMapOvr>
+</p:sld>
+</file>
+
+<file path=ppt/slides/slide6.xml><?xml version="1.0" encoding="utf-8"?>
+<p:sld xmlns:a="http://schemas.openxmlformats.org/drawingml/2006/main" xmlns:r="http://schemas.openxmlformats.org/officeDocument/2006/relationships" xmlns:p="http://schemas.openxmlformats.org/presentationml/2006/main">
+  <p:cSld>
+    <p:spTree>
+      <p:nvGrpSpPr>
+        <p:cNvPr id="1" name=""/>
+        <p:cNvGrpSpPr/>
+        <p:nvPr/>
+      </p:nvGrpSpPr>
+      <p:grpSpPr>
+        <a:xfrm>
+          <a:off x="0" y="0"/>
+          <a:ext cx="0" cy="0"/>
+          <a:chOff x="0" y="0"/>
+          <a:chExt cx="0" cy="0"/>
+        </a:xfrm>
+      </p:grpSpPr>
+      <p:sp>
+        <p:nvSpPr>
+          <p:cNvPr id="2" name="Titel 1"/>
+          <p:cNvSpPr>
+            <a:spLocks noGrp="1"/>
+          </p:cNvSpPr>
+          <p:nvPr>
+            <p:ph type="title"/>
+          </p:nvPr>
+        </p:nvSpPr>
+        <p:spPr/>
+        <p:txBody>
+          <a:bodyPr/>
+          <a:lstStyle/>
+          <a:p>
+            <a:r>
+              <a:rPr lang="de-AT" dirty="0">
+                <a:latin typeface="DejaVu Serif" panose="02060603050605020204" pitchFamily="18" charset="0"/>
+                <a:ea typeface="DejaVu Serif" panose="02060603050605020204" pitchFamily="18" charset="0"/>
+                <a:cs typeface="DejaVu Serif" panose="02060603050605020204" pitchFamily="18" charset="0"/>
+              </a:rPr>
+              <a:t>Zieldefinition</a:t>
+            </a:r>
+          </a:p>
+        </p:txBody>
+      </p:sp>
+      <p:sp>
+        <p:nvSpPr>
+          <p:cNvPr id="3" name="Inhaltsplatzhalter 2"/>
+          <p:cNvSpPr>
+            <a:spLocks noGrp="1"/>
+          </p:cNvSpPr>
+          <p:nvPr>
+            <p:ph idx="1"/>
+          </p:nvPr>
+        </p:nvSpPr>
+        <p:spPr/>
+        <p:txBody>
+          <a:bodyPr>
+            <a:normAutofit fontScale="55000" lnSpcReduction="20000"/>
+          </a:bodyPr>
+          <a:lstStyle/>
+          <a:p>
+            <a:r>
+              <a:rPr lang="de-AT" dirty="0"/>
+              <a:t>Demo Version</a:t>
+            </a:r>
+          </a:p>
+          <a:p>
+            <a:r>
+              <a:rPr lang="de-AT" dirty="0"/>
+              <a:t>Empfohlener Termin: 10.01.2017</a:t>
+            </a:r>
+          </a:p>
+          <a:p>
+            <a:r>
+              <a:rPr lang="de-AT" dirty="0"/>
+              <a:t>Letzter möglicher Termin: 17.01.2017 </a:t>
+            </a:r>
+          </a:p>
+          <a:p>
+            <a:r>
+              <a:rPr lang="de-AT" dirty="0"/>
+              <a:t>Benötigt: </a:t>
+            </a:r>
+          </a:p>
+          <a:p>
+            <a:pPr lvl="1"/>
+            <a:r>
+              <a:rPr lang="de-AT" dirty="0"/>
+              <a:t>1 Level mit 2 Ebenen </a:t>
+            </a:r>
+          </a:p>
+          <a:p>
+            <a:pPr lvl="1"/>
+            <a:r>
+              <a:rPr lang="de-AT" dirty="0"/>
+              <a:t>1 Boss </a:t>
+            </a:r>
+          </a:p>
+          <a:p>
+            <a:pPr lvl="1"/>
+            <a:r>
+              <a:rPr lang="de-AT" dirty="0"/>
+              <a:t>2 Gegner </a:t>
+            </a:r>
+          </a:p>
+          <a:p>
+            <a:pPr lvl="1"/>
+            <a:r>
+              <a:rPr lang="de-AT" dirty="0"/>
+              <a:t>1 Charakter </a:t>
+            </a:r>
+          </a:p>
+          <a:p>
+            <a:pPr lvl="1"/>
+            <a:r>
+              <a:rPr lang="de-AT" dirty="0"/>
+              <a:t>1 Item (Angriff)</a:t>
+            </a:r>
+          </a:p>
+          <a:p>
+            <a:r>
+              <a:rPr lang="de-AT" dirty="0"/>
+              <a:t>Prioritäten bei der Entwicklung: </a:t>
+            </a:r>
+          </a:p>
+          <a:p>
+            <a:pPr lvl="1"/>
+            <a:r>
+              <a:rPr lang="de-AT" dirty="0"/>
+              <a:t>Level </a:t>
+            </a:r>
+          </a:p>
+          <a:p>
+            <a:pPr lvl="1"/>
+            <a:r>
+              <a:rPr lang="de-AT" dirty="0"/>
+              <a:t>Bewegung (Kamera) </a:t>
+            </a:r>
+          </a:p>
+          <a:p>
+            <a:pPr lvl="1"/>
+            <a:r>
+              <a:rPr lang="de-AT" dirty="0"/>
+              <a:t>Charakter </a:t>
+            </a:r>
+          </a:p>
+          <a:p>
+            <a:pPr lvl="2"/>
+            <a:r>
+              <a:rPr lang="de-AT" dirty="0"/>
+              <a:t>Gegner </a:t>
+            </a:r>
+          </a:p>
+          <a:p>
+            <a:pPr lvl="2"/>
+            <a:r>
+              <a:rPr lang="de-AT" dirty="0"/>
+              <a:t>Spieler </a:t>
+            </a:r>
+          </a:p>
+          <a:p>
+            <a:pPr lvl="2"/>
+            <a:r>
+              <a:rPr lang="de-AT" dirty="0"/>
+              <a:t>Angriff </a:t>
+            </a:r>
+          </a:p>
+          <a:p>
+            <a:pPr lvl="2"/>
+            <a:r>
+              <a:rPr lang="de-AT" dirty="0"/>
+              <a:t>Items </a:t>
+            </a:r>
+          </a:p>
+          <a:p>
+            <a:pPr lvl="2"/>
+            <a:r>
+              <a:rPr lang="de-AT" dirty="0"/>
+              <a:t>Waffen</a:t>
+            </a:r>
+          </a:p>
+        </p:txBody>
+      </p:sp>
+    </p:spTree>
+    <p:extLst>
+      <p:ext uri="{BB962C8B-B14F-4D97-AF65-F5344CB8AC3E}">
+        <p14:creationId xmlns:p14="http://schemas.microsoft.com/office/powerpoint/2010/main" val="2423027553"/>
+      </p:ext>
+    </p:extLst>
+  </p:cSld>
+  <p:clrMapOvr>
+    <a:masterClrMapping/>
+  </p:clrMapOvr>
+</p:sld>
+</file>
+
+<file path=ppt/slides/slide7.xml><?xml version="1.0" encoding="utf-8"?>
+<p:sld xmlns:a="http://schemas.openxmlformats.org/drawingml/2006/main" xmlns:r="http://schemas.openxmlformats.org/officeDocument/2006/relationships" xmlns:p="http://schemas.openxmlformats.org/presentationml/2006/main">
+  <p:cSld>
+    <p:spTree>
+      <p:nvGrpSpPr>
+        <p:cNvPr id="1" name=""/>
+        <p:cNvGrpSpPr/>
+        <p:nvPr/>
+      </p:nvGrpSpPr>
+      <p:grpSpPr>
+        <a:xfrm>
+          <a:off x="0" y="0"/>
+          <a:ext cx="0" cy="0"/>
+          <a:chOff x="0" y="0"/>
+          <a:chExt cx="0" cy="0"/>
+        </a:xfrm>
+      </p:grpSpPr>
+      <p:sp>
+        <p:nvSpPr>
+          <p:cNvPr id="2" name="Titel 1"/>
+          <p:cNvSpPr>
+            <a:spLocks noGrp="1"/>
+          </p:cNvSpPr>
+          <p:nvPr>
+            <p:ph type="title"/>
+          </p:nvPr>
+        </p:nvSpPr>
+        <p:spPr/>
+        <p:txBody>
+          <a:bodyPr/>
+          <a:lstStyle/>
+          <a:p>
+            <a:r>
+              <a:rPr lang="de-AT" dirty="0"/>
+              <a:t>Deadlines</a:t>
+            </a:r>
+          </a:p>
+        </p:txBody>
+      </p:sp>
+      <p:sp>
+        <p:nvSpPr>
+          <p:cNvPr id="3" name="Inhaltsplatzhalter 2"/>
+          <p:cNvSpPr>
+            <a:spLocks noGrp="1"/>
+          </p:cNvSpPr>
+          <p:nvPr>
+            <p:ph idx="1"/>
+          </p:nvPr>
+        </p:nvSpPr>
+        <p:spPr/>
+        <p:txBody>
+          <a:bodyPr/>
+          <a:lstStyle/>
+          <a:p>
+            <a:r>
+              <a:rPr lang="de-AT" dirty="0"/>
+              <a:t>Demo Version</a:t>
+            </a:r>
+          </a:p>
+          <a:p>
+            <a:pPr lvl="1"/>
+            <a:r>
+              <a:rPr lang="de-AT" dirty="0"/>
+              <a:t>Empfohlener Termin: 10.01.2017</a:t>
+            </a:r>
+          </a:p>
+          <a:p>
+            <a:pPr lvl="1"/>
+            <a:r>
+              <a:rPr lang="de-AT" dirty="0"/>
+              <a:t>Letzter möglicher Termin: 17.01.2017 </a:t>
+            </a:r>
+          </a:p>
+          <a:p>
+            <a:r>
+              <a:rPr lang="de-AT" dirty="0"/>
+              <a:t>Prototyp ohne Content</a:t>
+            </a:r>
+          </a:p>
+          <a:p>
+            <a:pPr lvl="1"/>
+            <a:r>
+              <a:rPr lang="de-AT" dirty="0"/>
+              <a:t>4 - 8 Wochen? (Mitte - Ende November)</a:t>
+            </a:r>
+          </a:p>
+          <a:p>
+            <a:r>
+              <a:rPr lang="de-AT" dirty="0"/>
+              <a:t>Prototyp mit Content</a:t>
+            </a:r>
+          </a:p>
+          <a:p>
+            <a:pPr lvl="1"/>
+            <a:r>
+              <a:rPr lang="de-AT" dirty="0"/>
+              <a:t>2 – 4 Wochen? (Mitte - Ende Dezember)</a:t>
+            </a:r>
+          </a:p>
+        </p:txBody>
+      </p:sp>
+    </p:spTree>
+    <p:extLst>
+      <p:ext uri="{BB962C8B-B14F-4D97-AF65-F5344CB8AC3E}">
+        <p14:creationId xmlns:p14="http://schemas.microsoft.com/office/powerpoint/2010/main" val="1363686406"/>
+      </p:ext>
+    </p:extLst>
+  </p:cSld>
+  <p:clrMapOvr>
+    <a:masterClrMapping/>
+  </p:clrMapOvr>
+</p:sld>
+</file>
+
+<file path=ppt/slides/slide8.xml><?xml version="1.0" encoding="utf-8"?>
+<p:sld xmlns:a="http://schemas.openxmlformats.org/drawingml/2006/main" xmlns:r="http://schemas.openxmlformats.org/officeDocument/2006/relationships" xmlns:p="http://schemas.openxmlformats.org/presentationml/2006/main">
+  <p:cSld>
+    <p:spTree>
+      <p:nvGrpSpPr>
+        <p:cNvPr id="1" name=""/>
+        <p:cNvGrpSpPr/>
+        <p:nvPr/>
+      </p:nvGrpSpPr>
+      <p:grpSpPr>
+        <a:xfrm>
+          <a:off x="0" y="0"/>
+          <a:ext cx="0" cy="0"/>
+          <a:chOff x="0" y="0"/>
+          <a:chExt cx="0" cy="0"/>
+        </a:xfrm>
+      </p:grpSpPr>
+      <p:sp>
+        <p:nvSpPr>
+          <p:cNvPr id="2" name="Titel 1"/>
+          <p:cNvSpPr>
+            <a:spLocks noGrp="1"/>
+          </p:cNvSpPr>
+          <p:nvPr>
+            <p:ph type="title"/>
+          </p:nvPr>
+        </p:nvSpPr>
+        <p:spPr/>
+        <p:txBody>
+          <a:bodyPr>
+            <a:normAutofit/>
+          </a:bodyPr>
+          <a:lstStyle/>
+          <a:p>
+            <a:r>
+              <a:rPr lang="de-AT" dirty="0">
+                <a:latin typeface="DejaVu Serif" panose="02060603050605020204" pitchFamily="18" charset="0"/>
+                <a:ea typeface="DejaVu Serif" panose="02060603050605020204" pitchFamily="18" charset="0"/>
+                <a:cs typeface="DejaVu Serif" panose="02060603050605020204" pitchFamily="18" charset="0"/>
+              </a:rPr>
+              <a:t>Kosten / Gewinn</a:t>
+            </a:r>
+          </a:p>
+        </p:txBody>
+      </p:sp>
+      <p:sp>
+        <p:nvSpPr>
+          <p:cNvPr id="3" name="Inhaltsplatzhalter 2"/>
+          <p:cNvSpPr>
+            <a:spLocks noGrp="1"/>
+          </p:cNvSpPr>
+          <p:nvPr>
+            <p:ph idx="1"/>
+          </p:nvPr>
+        </p:nvSpPr>
+        <p:spPr/>
+        <p:txBody>
+          <a:bodyPr>
+            <a:normAutofit fontScale="92500" lnSpcReduction="10000"/>
+          </a:bodyPr>
+          <a:lstStyle/>
+          <a:p>
+            <a:r>
+              <a:rPr lang="de-AT" dirty="0"/>
+              <a:t>Unity ( &gt; 100.000€ / Jahr)</a:t>
+            </a:r>
+          </a:p>
+          <a:p>
+            <a:r>
+              <a:rPr lang="de-AT" dirty="0"/>
+              <a:t>Realm of the Mad God 1.700.000 Spieler (Gratis)</a:t>
+            </a:r>
+          </a:p>
+          <a:p>
+            <a:pPr lvl="1"/>
+            <a:r>
+              <a:rPr lang="de-AT" dirty="0"/>
+              <a:t>80% User Score</a:t>
+            </a:r>
+          </a:p>
+          <a:p>
+            <a:pPr lvl="1"/>
+            <a:r>
+              <a:rPr lang="de-AT" dirty="0"/>
+              <a:t>Viele Spieler wünschen sich ein besseres Spiel</a:t>
+            </a:r>
+          </a:p>
+          <a:p>
+            <a:pPr lvl="1"/>
+            <a:r>
+              <a:rPr lang="de-AT" dirty="0"/>
+              <a:t>Pay2Win</a:t>
+            </a:r>
+          </a:p>
+          <a:p>
+            <a:r>
+              <a:rPr lang="de-AT" dirty="0"/>
+              <a:t>Titan </a:t>
+            </a:r>
+            <a:r>
+              <a:rPr lang="de-AT" dirty="0" err="1"/>
+              <a:t>Souls</a:t>
+            </a:r>
+            <a:r>
+              <a:rPr lang="de-AT" dirty="0"/>
+              <a:t> 170.000 Spieler (14.99€)</a:t>
+            </a:r>
+          </a:p>
+          <a:p>
+            <a:r>
+              <a:rPr lang="de-AT" dirty="0"/>
+              <a:t>Dungeon </a:t>
+            </a:r>
+            <a:r>
+              <a:rPr lang="de-AT" dirty="0" err="1"/>
+              <a:t>Souls</a:t>
+            </a:r>
+            <a:r>
+              <a:rPr lang="de-AT" dirty="0"/>
+              <a:t> 35.000 Spieler (12.99€)</a:t>
+            </a:r>
+          </a:p>
+          <a:p>
+            <a:r>
+              <a:rPr lang="de-AT" dirty="0"/>
+              <a:t>Enter the </a:t>
+            </a:r>
+            <a:r>
+              <a:rPr lang="de-AT" dirty="0" err="1"/>
+              <a:t>Gungeon</a:t>
+            </a:r>
+            <a:r>
+              <a:rPr lang="de-AT" dirty="0"/>
+              <a:t> 414.000 Spieler (14.99€)</a:t>
+            </a:r>
+          </a:p>
+          <a:p>
+            <a:r>
+              <a:rPr lang="de-AT" dirty="0"/>
+              <a:t>Skins</a:t>
+            </a:r>
+          </a:p>
+          <a:p>
+            <a:pPr lvl="1"/>
+            <a:r>
+              <a:rPr lang="de-AT" dirty="0"/>
+              <a:t>Characters</a:t>
+            </a:r>
+          </a:p>
+          <a:p>
+            <a:pPr lvl="1"/>
+            <a:r>
+              <a:rPr lang="de-AT" dirty="0"/>
+              <a:t>Items</a:t>
+            </a:r>
+          </a:p>
+          <a:p>
+            <a:endParaRPr lang="de-AT" dirty="0"/>
+          </a:p>
+        </p:txBody>
+      </p:sp>
+    </p:spTree>
+    <p:extLst>
+      <p:ext uri="{BB962C8B-B14F-4D97-AF65-F5344CB8AC3E}">
+        <p14:creationId xmlns:p14="http://schemas.microsoft.com/office/powerpoint/2010/main" val="1050757460"/>
       </p:ext>
     </p:extLst>
   </p:cSld>

</xml_diff>